<commit_message>
public domain info added
</commit_message>
<xml_diff>
--- a/defensive-publications/e-receipts.pptx
+++ b/defensive-publications/e-receipts.pptx
@@ -262,7 +262,7 @@
           <a:p>
             <a:fld id="{35CC73B5-F36B-4506-8E26-0B0C91D7503F}" type="datetimeFigureOut">
               <a:rPr lang="en-US" smtClean="0"/>
-              <a:t>2023-11-27</a:t>
+              <a:t>2023-12-07</a:t>
             </a:fld>
             <a:endParaRPr lang="en-US"/>
           </a:p>
@@ -550,7 +550,7 @@
           <a:p>
             <a:fld id="{35CC73B5-F36B-4506-8E26-0B0C91D7503F}" type="datetimeFigureOut">
               <a:rPr lang="en-US" smtClean="0"/>
-              <a:t>2023-11-27</a:t>
+              <a:t>2023-12-07</a:t>
             </a:fld>
             <a:endParaRPr lang="en-US"/>
           </a:p>
@@ -748,7 +748,7 @@
           <a:p>
             <a:fld id="{35CC73B5-F36B-4506-8E26-0B0C91D7503F}" type="datetimeFigureOut">
               <a:rPr lang="en-US" smtClean="0"/>
-              <a:t>2023-11-27</a:t>
+              <a:t>2023-12-07</a:t>
             </a:fld>
             <a:endParaRPr lang="en-US"/>
           </a:p>
@@ -956,7 +956,7 @@
           <a:p>
             <a:fld id="{35CC73B5-F36B-4506-8E26-0B0C91D7503F}" type="datetimeFigureOut">
               <a:rPr lang="en-US" smtClean="0"/>
-              <a:t>2023-11-27</a:t>
+              <a:t>2023-12-07</a:t>
             </a:fld>
             <a:endParaRPr lang="en-US"/>
           </a:p>
@@ -1160,7 +1160,7 @@
           <a:p>
             <a:fld id="{35CC73B5-F36B-4506-8E26-0B0C91D7503F}" type="datetimeFigureOut">
               <a:rPr lang="en-US" smtClean="0"/>
-              <a:t>2023-11-27</a:t>
+              <a:t>2023-12-07</a:t>
             </a:fld>
             <a:endParaRPr lang="en-US"/>
           </a:p>
@@ -1330,7 +1330,7 @@
           <a:p>
             <a:fld id="{35CC73B5-F36B-4506-8E26-0B0C91D7503F}" type="datetimeFigureOut">
               <a:rPr lang="en-US" smtClean="0"/>
-              <a:t>2023-11-27</a:t>
+              <a:t>2023-12-07</a:t>
             </a:fld>
             <a:endParaRPr lang="en-US" dirty="0"/>
           </a:p>
@@ -1574,7 +1574,7 @@
           <a:p>
             <a:fld id="{35CC73B5-F36B-4506-8E26-0B0C91D7503F}" type="datetimeFigureOut">
               <a:rPr lang="en-US" smtClean="0"/>
-              <a:t>2023-11-27</a:t>
+              <a:t>2023-12-07</a:t>
             </a:fld>
             <a:endParaRPr lang="en-US"/>
           </a:p>
@@ -1806,7 +1806,7 @@
           <a:p>
             <a:fld id="{35CC73B5-F36B-4506-8E26-0B0C91D7503F}" type="datetimeFigureOut">
               <a:rPr lang="en-US" smtClean="0"/>
-              <a:t>2023-11-27</a:t>
+              <a:t>2023-12-07</a:t>
             </a:fld>
             <a:endParaRPr lang="en-US"/>
           </a:p>
@@ -2173,7 +2173,7 @@
           <a:p>
             <a:fld id="{35CC73B5-F36B-4506-8E26-0B0C91D7503F}" type="datetimeFigureOut">
               <a:rPr lang="en-US" smtClean="0"/>
-              <a:t>2023-11-27</a:t>
+              <a:t>2023-12-07</a:t>
             </a:fld>
             <a:endParaRPr lang="en-US"/>
           </a:p>
@@ -2291,7 +2291,7 @@
           <a:p>
             <a:fld id="{35CC73B5-F36B-4506-8E26-0B0C91D7503F}" type="datetimeFigureOut">
               <a:rPr lang="en-US" smtClean="0"/>
-              <a:t>2023-11-27</a:t>
+              <a:t>2023-12-07</a:t>
             </a:fld>
             <a:endParaRPr lang="en-US"/>
           </a:p>
@@ -2386,7 +2386,7 @@
           <a:p>
             <a:fld id="{35CC73B5-F36B-4506-8E26-0B0C91D7503F}" type="datetimeFigureOut">
               <a:rPr lang="en-US" smtClean="0"/>
-              <a:t>2023-11-27</a:t>
+              <a:t>2023-12-07</a:t>
             </a:fld>
             <a:endParaRPr lang="en-US"/>
           </a:p>
@@ -2728,7 +2728,7 @@
           <a:p>
             <a:fld id="{35CC73B5-F36B-4506-8E26-0B0C91D7503F}" type="datetimeFigureOut">
               <a:rPr lang="en-US" smtClean="0"/>
-              <a:t>2023-11-27</a:t>
+              <a:t>2023-12-07</a:t>
             </a:fld>
             <a:endParaRPr lang="en-US"/>
           </a:p>
@@ -2985,7 +2985,7 @@
           <a:p>
             <a:fld id="{35CC73B5-F36B-4506-8E26-0B0C91D7503F}" type="datetimeFigureOut">
               <a:rPr lang="en-US" smtClean="0"/>
-              <a:t>2023-11-27</a:t>
+              <a:t>2023-12-07</a:t>
             </a:fld>
             <a:endParaRPr lang="en-US"/>
           </a:p>
@@ -3155,7 +3155,7 @@
           <a:p>
             <a:fld id="{35CC73B5-F36B-4506-8E26-0B0C91D7503F}" type="datetimeFigureOut">
               <a:rPr lang="en-US" smtClean="0"/>
-              <a:t>2023-11-27</a:t>
+              <a:t>2023-12-07</a:t>
             </a:fld>
             <a:endParaRPr lang="en-US"/>
           </a:p>
@@ -3335,7 +3335,7 @@
           <a:p>
             <a:fld id="{35CC73B5-F36B-4506-8E26-0B0C91D7503F}" type="datetimeFigureOut">
               <a:rPr lang="en-US" smtClean="0"/>
-              <a:t>2023-11-27</a:t>
+              <a:t>2023-12-07</a:t>
             </a:fld>
             <a:endParaRPr lang="en-US"/>
           </a:p>
@@ -3594,7 +3594,7 @@
           <a:p>
             <a:fld id="{35CC73B5-F36B-4506-8E26-0B0C91D7503F}" type="datetimeFigureOut">
               <a:rPr lang="en-US" smtClean="0"/>
-              <a:t>2023-11-27</a:t>
+              <a:t>2023-12-07</a:t>
             </a:fld>
             <a:endParaRPr lang="en-US" dirty="0"/>
           </a:p>
@@ -3869,7 +3869,7 @@
           <a:p>
             <a:fld id="{35CC73B5-F36B-4506-8E26-0B0C91D7503F}" type="datetimeFigureOut">
               <a:rPr lang="en-US" smtClean="0"/>
-              <a:t>2023-11-27</a:t>
+              <a:t>2023-12-07</a:t>
             </a:fld>
             <a:endParaRPr lang="en-US"/>
           </a:p>
@@ -4134,7 +4134,7 @@
           <a:p>
             <a:fld id="{35CC73B5-F36B-4506-8E26-0B0C91D7503F}" type="datetimeFigureOut">
               <a:rPr lang="en-US" smtClean="0"/>
-              <a:t>2023-11-27</a:t>
+              <a:t>2023-12-07</a:t>
             </a:fld>
             <a:endParaRPr lang="en-US"/>
           </a:p>
@@ -4546,7 +4546,7 @@
           <a:p>
             <a:fld id="{35CC73B5-F36B-4506-8E26-0B0C91D7503F}" type="datetimeFigureOut">
               <a:rPr lang="en-US" smtClean="0"/>
-              <a:t>2023-11-27</a:t>
+              <a:t>2023-12-07</a:t>
             </a:fld>
             <a:endParaRPr lang="en-US"/>
           </a:p>
@@ -4687,7 +4687,7 @@
           <a:p>
             <a:fld id="{35CC73B5-F36B-4506-8E26-0B0C91D7503F}" type="datetimeFigureOut">
               <a:rPr lang="en-US" smtClean="0"/>
-              <a:t>2023-11-27</a:t>
+              <a:t>2023-12-07</a:t>
             </a:fld>
             <a:endParaRPr lang="en-US"/>
           </a:p>
@@ -4800,7 +4800,7 @@
           <a:p>
             <a:fld id="{35CC73B5-F36B-4506-8E26-0B0C91D7503F}" type="datetimeFigureOut">
               <a:rPr lang="en-US" smtClean="0"/>
-              <a:t>2023-11-27</a:t>
+              <a:t>2023-12-07</a:t>
             </a:fld>
             <a:endParaRPr lang="en-US"/>
           </a:p>
@@ -5111,7 +5111,7 @@
           <a:p>
             <a:fld id="{35CC73B5-F36B-4506-8E26-0B0C91D7503F}" type="datetimeFigureOut">
               <a:rPr lang="en-US" smtClean="0"/>
-              <a:t>2023-11-27</a:t>
+              <a:t>2023-12-07</a:t>
             </a:fld>
             <a:endParaRPr lang="en-US"/>
           </a:p>
@@ -5352,7 +5352,7 @@
           <a:p>
             <a:fld id="{35CC73B5-F36B-4506-8E26-0B0C91D7503F}" type="datetimeFigureOut">
               <a:rPr lang="en-US" smtClean="0"/>
-              <a:t>2023-11-27</a:t>
+              <a:t>2023-12-07</a:t>
             </a:fld>
             <a:endParaRPr lang="en-US"/>
           </a:p>
@@ -5905,7 +5905,7 @@
           <a:p>
             <a:fld id="{35CC73B5-F36B-4506-8E26-0B0C91D7503F}" type="datetimeFigureOut">
               <a:rPr lang="en-US" smtClean="0"/>
-              <a:t>2023-11-27</a:t>
+              <a:t>2023-12-07</a:t>
             </a:fld>
             <a:endParaRPr lang="en-US"/>
           </a:p>
@@ -7103,6 +7103,170 @@
                 <a:latin typeface="Impact" panose="020B0806030902050204" pitchFamily="34" charset="0"/>
               </a:rPr>
               <a:t>OBSOLETE</a:t>
+            </a:r>
+          </a:p>
+        </p:txBody>
+      </p:sp>
+      <p:sp>
+        <p:nvSpPr>
+          <p:cNvPr id="2" name="Right Brace 1">
+            <a:extLst>
+              <a:ext uri="{FF2B5EF4-FFF2-40B4-BE49-F238E27FC236}">
+                <a16:creationId xmlns:a16="http://schemas.microsoft.com/office/drawing/2014/main" id="{3F0B5EFE-29C7-5E14-9D48-672C0D28D648}"/>
+              </a:ext>
+            </a:extLst>
+          </p:cNvPr>
+          <p:cNvSpPr/>
+          <p:nvPr/>
+        </p:nvSpPr>
+        <p:spPr>
+          <a:xfrm>
+            <a:off x="3291841" y="2079607"/>
+            <a:ext cx="193330" cy="966651"/>
+          </a:xfrm>
+          <a:prstGeom prst="rightBrace">
+            <a:avLst/>
+          </a:prstGeom>
+          <a:ln w="9525">
+            <a:solidFill>
+              <a:schemeClr val="tx1"/>
+            </a:solidFill>
+          </a:ln>
+        </p:spPr>
+        <p:style>
+          <a:lnRef idx="1">
+            <a:schemeClr val="accent1"/>
+          </a:lnRef>
+          <a:fillRef idx="0">
+            <a:schemeClr val="accent1"/>
+          </a:fillRef>
+          <a:effectRef idx="0">
+            <a:schemeClr val="accent1"/>
+          </a:effectRef>
+          <a:fontRef idx="minor">
+            <a:schemeClr val="tx1"/>
+          </a:fontRef>
+        </p:style>
+        <p:txBody>
+          <a:bodyPr rtlCol="0" anchor="ctr"/>
+          <a:lstStyle/>
+          <a:p>
+            <a:pPr algn="ctr"/>
+            <a:endParaRPr lang="en-US"/>
+          </a:p>
+        </p:txBody>
+      </p:sp>
+      <p:sp>
+        <p:nvSpPr>
+          <p:cNvPr id="3" name="TextBox 2">
+            <a:extLst>
+              <a:ext uri="{FF2B5EF4-FFF2-40B4-BE49-F238E27FC236}">
+                <a16:creationId xmlns:a16="http://schemas.microsoft.com/office/drawing/2014/main" id="{7FB84BD6-E5DB-2DF9-BCB9-ECF5F4E1A636}"/>
+              </a:ext>
+            </a:extLst>
+          </p:cNvPr>
+          <p:cNvSpPr txBox="1"/>
+          <p:nvPr/>
+        </p:nvSpPr>
+        <p:spPr>
+          <a:xfrm>
+            <a:off x="3463706" y="2393655"/>
+            <a:ext cx="2936947" cy="338554"/>
+          </a:xfrm>
+          <a:prstGeom prst="rect">
+            <a:avLst/>
+          </a:prstGeom>
+          <a:noFill/>
+        </p:spPr>
+        <p:txBody>
+          <a:bodyPr wrap="square" rtlCol="0">
+            <a:spAutoFit/>
+          </a:bodyPr>
+          <a:lstStyle/>
+          <a:p>
+            <a:r>
+              <a:rPr lang="en-US" sz="1600" dirty="0"/>
+              <a:t>Non-normative sample request</a:t>
+            </a:r>
+          </a:p>
+        </p:txBody>
+      </p:sp>
+      <p:sp>
+        <p:nvSpPr>
+          <p:cNvPr id="12" name="Rectangle: Rounded Corners 11">
+            <a:extLst>
+              <a:ext uri="{FF2B5EF4-FFF2-40B4-BE49-F238E27FC236}">
+                <a16:creationId xmlns:a16="http://schemas.microsoft.com/office/drawing/2014/main" id="{75B63814-13D5-CC6E-C48A-A69C81042D1B}"/>
+              </a:ext>
+            </a:extLst>
+          </p:cNvPr>
+          <p:cNvSpPr/>
+          <p:nvPr/>
+        </p:nvSpPr>
+        <p:spPr>
+          <a:xfrm>
+            <a:off x="8001610" y="173439"/>
+            <a:ext cx="944653" cy="497384"/>
+          </a:xfrm>
+          <a:prstGeom prst="roundRect">
+            <a:avLst>
+              <a:gd name="adj" fmla="val 13744"/>
+            </a:avLst>
+          </a:prstGeom>
+          <a:noFill/>
+        </p:spPr>
+        <p:style>
+          <a:lnRef idx="2">
+            <a:schemeClr val="accent1">
+              <a:shade val="15000"/>
+            </a:schemeClr>
+          </a:lnRef>
+          <a:fillRef idx="1">
+            <a:schemeClr val="accent1"/>
+          </a:fillRef>
+          <a:effectRef idx="0">
+            <a:schemeClr val="accent1"/>
+          </a:effectRef>
+          <a:fontRef idx="minor">
+            <a:schemeClr val="lt1"/>
+          </a:fontRef>
+        </p:style>
+        <p:txBody>
+          <a:bodyPr wrap="none" lIns="36000" tIns="0" rIns="36000" bIns="0" rtlCol="0" anchor="ctr">
+            <a:spAutoFit/>
+          </a:bodyPr>
+          <a:lstStyle/>
+          <a:p>
+            <a:pPr algn="ctr"/>
+            <a:r>
+              <a:rPr lang="en-US" sz="1000" dirty="0">
+                <a:solidFill>
+                  <a:schemeClr val="tx1"/>
+                </a:solidFill>
+              </a:rPr>
+              <a:t>This invention is</a:t>
+            </a:r>
+          </a:p>
+          <a:p>
+            <a:pPr algn="ctr"/>
+            <a:r>
+              <a:rPr lang="en-US" sz="1000" dirty="0">
+                <a:solidFill>
+                  <a:schemeClr val="tx1"/>
+                </a:solidFill>
+              </a:rPr>
+              <a:t>herby put in the</a:t>
+            </a:r>
+          </a:p>
+          <a:p>
+            <a:pPr algn="ctr"/>
+            <a:r>
+              <a:rPr lang="en-US" sz="1000" dirty="0">
+                <a:solidFill>
+                  <a:schemeClr val="tx1"/>
+                </a:solidFill>
+              </a:rPr>
+              <a:t>public domain</a:t>
             </a:r>
           </a:p>
         </p:txBody>

</xml_diff>